<commit_message>
add notes for model description
</commit_message>
<xml_diff>
--- a/ASME_Hackathon.pptx
+++ b/ASME_Hackathon.pptx
@@ -3362,7 +3362,7 @@
           <a:p>
             <a:fld id="{0D303AE6-1C94-40BC-8335-42DC15F5D020}" type="datetimeFigureOut">
               <a:rPr lang="en-US" smtClean="0"/>
-              <a:t>8/15/2020</a:t>
+              <a:t>8/16/2020</a:t>
             </a:fld>
             <a:endParaRPr lang="en-US"/>
           </a:p>
@@ -4148,10 +4148,7 @@
           <a:bodyPr/>
           <a:lstStyle/>
           <a:p>
-            <a:r>
-              <a:rPr lang="en-US" dirty="0"/>
-              <a:t>This is the overview of our approach</a:t>
-            </a:r>
+            <a:endParaRPr lang="en-US" dirty="0"/>
           </a:p>
         </p:txBody>
       </p:sp>
@@ -4172,7 +4169,7 @@
           <a:p>
             <a:fld id="{424DEAEC-6500-4F50-BF9D-EF2286C6C2D5}" type="slidenum">
               <a:rPr lang="en-US" smtClean="0"/>
-              <a:t>8</a:t>
+              <a:t>7</a:t>
             </a:fld>
             <a:endParaRPr lang="en-US"/>
           </a:p>
@@ -4181,7 +4178,7 @@
     </p:spTree>
     <p:extLst>
       <p:ext uri="{BB962C8B-B14F-4D97-AF65-F5344CB8AC3E}">
-        <p14:creationId xmlns:p14="http://schemas.microsoft.com/office/powerpoint/2010/main" val="21589198"/>
+        <p14:creationId xmlns:p14="http://schemas.microsoft.com/office/powerpoint/2010/main" val="919862737"/>
       </p:ext>
     </p:extLst>
   </p:cSld>
@@ -4237,7 +4234,7 @@
           <a:p>
             <a:r>
               <a:rPr lang="en-US" dirty="0"/>
-              <a:t>Get a closer look at the data fusion technique we are using</a:t>
+              <a:t>This is the overview of our approach</a:t>
             </a:r>
           </a:p>
           <a:p>
@@ -4246,8 +4243,13 @@
           <a:p>
             <a:r>
               <a:rPr lang="en-US" dirty="0"/>
-              <a:t>Each color are corresponding to some specific meaning</a:t>
-            </a:r>
+              <a:t>Data from a small neighborhood around the melt pool is fused into three channels, representing power, speed and temporal order respectively. The generated image accounts for both spatial and temporal neighborhood effects when used for training. Melt pool sizes are extracted from the corresponding camera images before categorizing into multiple classes based </a:t>
+            </a:r>
+            <a:r>
+              <a:rPr lang="en-US"/>
+              <a:t>on quantiles.</a:t>
+            </a:r>
+            <a:endParaRPr lang="en-US" dirty="0"/>
           </a:p>
         </p:txBody>
       </p:sp>
@@ -4268,6 +4270,102 @@
           <a:p>
             <a:fld id="{424DEAEC-6500-4F50-BF9D-EF2286C6C2D5}" type="slidenum">
               <a:rPr lang="en-US" smtClean="0"/>
+              <a:t>8</a:t>
+            </a:fld>
+            <a:endParaRPr lang="en-US"/>
+          </a:p>
+        </p:txBody>
+      </p:sp>
+    </p:spTree>
+    <p:extLst>
+      <p:ext uri="{BB962C8B-B14F-4D97-AF65-F5344CB8AC3E}">
+        <p14:creationId xmlns:p14="http://schemas.microsoft.com/office/powerpoint/2010/main" val="21589198"/>
+      </p:ext>
+    </p:extLst>
+  </p:cSld>
+  <p:clrMapOvr>
+    <a:masterClrMapping/>
+  </p:clrMapOvr>
+</p:notes>
+</file>
+
+<file path=ppt/notesSlides/notesSlide7.xml><?xml version="1.0" encoding="utf-8"?>
+<p:notes xmlns:a="http://schemas.openxmlformats.org/drawingml/2006/main" xmlns:r="http://schemas.openxmlformats.org/officeDocument/2006/relationships" xmlns:p="http://schemas.openxmlformats.org/presentationml/2006/main">
+  <p:cSld>
+    <p:spTree>
+      <p:nvGrpSpPr>
+        <p:cNvPr id="1" name=""/>
+        <p:cNvGrpSpPr/>
+        <p:nvPr/>
+      </p:nvGrpSpPr>
+      <p:grpSpPr>
+        <a:xfrm>
+          <a:off x="0" y="0"/>
+          <a:ext cx="0" cy="0"/>
+          <a:chOff x="0" y="0"/>
+          <a:chExt cx="0" cy="0"/>
+        </a:xfrm>
+      </p:grpSpPr>
+      <p:sp>
+        <p:nvSpPr>
+          <p:cNvPr id="2" name="Slide Image Placeholder 1"/>
+          <p:cNvSpPr>
+            <a:spLocks noGrp="1" noRot="1" noChangeAspect="1"/>
+          </p:cNvSpPr>
+          <p:nvPr>
+            <p:ph type="sldImg"/>
+          </p:nvPr>
+        </p:nvSpPr>
+        <p:spPr/>
+      </p:sp>
+      <p:sp>
+        <p:nvSpPr>
+          <p:cNvPr id="3" name="Notes Placeholder 2"/>
+          <p:cNvSpPr>
+            <a:spLocks noGrp="1"/>
+          </p:cNvSpPr>
+          <p:nvPr>
+            <p:ph type="body" idx="1"/>
+          </p:nvPr>
+        </p:nvSpPr>
+        <p:spPr/>
+        <p:txBody>
+          <a:bodyPr/>
+          <a:lstStyle/>
+          <a:p>
+            <a:r>
+              <a:rPr lang="en-US" dirty="0"/>
+              <a:t>Get a closer look at the data fusion technique we are using</a:t>
+            </a:r>
+          </a:p>
+          <a:p>
+            <a:endParaRPr lang="en-US" dirty="0"/>
+          </a:p>
+          <a:p>
+            <a:r>
+              <a:rPr lang="en-US" dirty="0"/>
+              <a:t>Each color are corresponding to some specific meaning</a:t>
+            </a:r>
+          </a:p>
+        </p:txBody>
+      </p:sp>
+      <p:sp>
+        <p:nvSpPr>
+          <p:cNvPr id="4" name="Slide Number Placeholder 3"/>
+          <p:cNvSpPr>
+            <a:spLocks noGrp="1"/>
+          </p:cNvSpPr>
+          <p:nvPr>
+            <p:ph type="sldNum" sz="quarter" idx="5"/>
+          </p:nvPr>
+        </p:nvSpPr>
+        <p:spPr/>
+        <p:txBody>
+          <a:bodyPr/>
+          <a:lstStyle/>
+          <a:p>
+            <a:fld id="{424DEAEC-6500-4F50-BF9D-EF2286C6C2D5}" type="slidenum">
+              <a:rPr lang="en-US" smtClean="0"/>
               <a:t>9</a:t>
             </a:fld>
             <a:endParaRPr lang="en-US"/>
@@ -4287,7 +4385,7 @@
 </p:notes>
 </file>
 
-<file path=ppt/notesSlides/notesSlide7.xml><?xml version="1.0" encoding="utf-8"?>
+<file path=ppt/notesSlides/notesSlide8.xml><?xml version="1.0" encoding="utf-8"?>
 <p:notes xmlns:a="http://schemas.openxmlformats.org/drawingml/2006/main" xmlns:r="http://schemas.openxmlformats.org/officeDocument/2006/relationships" xmlns:p="http://schemas.openxmlformats.org/presentationml/2006/main">
   <p:cSld>
     <p:spTree>
@@ -9455,8 +9553,8 @@
           </a:p>
         </p:txBody>
       </p:sp>
-      <mc:AlternateContent xmlns:mc="http://schemas.openxmlformats.org/markup-compatibility/2006">
-        <mc:Choice xmlns:a14="http://schemas.microsoft.com/office/drawing/2010/main" Requires="a14">
+      <mc:AlternateContent xmlns:mc="http://schemas.openxmlformats.org/markup-compatibility/2006" xmlns:a14="http://schemas.microsoft.com/office/drawing/2010/main">
+        <mc:Choice Requires="a14">
           <p:sp>
             <p:nvSpPr>
               <p:cNvPr id="20" name="TextBox 19">
@@ -9485,6 +9583,7 @@
               </a:bodyPr>
               <a:lstStyle/>
               <a:p>
+                <a:pPr/>
                 <a14:m>
                   <m:oMathPara xmlns:m="http://schemas.openxmlformats.org/officeDocument/2006/math">
                     <m:oMathParaPr>
@@ -9543,7 +9642,7 @@
             </p:txBody>
           </p:sp>
         </mc:Choice>
-        <mc:Fallback>
+        <mc:Fallback xmlns="">
           <p:sp>
             <p:nvSpPr>
               <p:cNvPr id="20" name="TextBox 19">
@@ -9642,8 +9741,8 @@
           </a:p>
         </p:txBody>
       </p:sp>
-      <mc:AlternateContent xmlns:mc="http://schemas.openxmlformats.org/markup-compatibility/2006">
-        <mc:Choice xmlns:a14="http://schemas.microsoft.com/office/drawing/2010/main" Requires="a14">
+      <mc:AlternateContent xmlns:mc="http://schemas.openxmlformats.org/markup-compatibility/2006" xmlns:a14="http://schemas.microsoft.com/office/drawing/2010/main">
+        <mc:Choice Requires="a14">
           <p:sp>
             <p:nvSpPr>
               <p:cNvPr id="26" name="TextBox 25">
@@ -9729,7 +9828,7 @@
             </p:txBody>
           </p:sp>
         </mc:Choice>
-        <mc:Fallback>
+        <mc:Fallback xmlns="">
           <p:sp>
             <p:nvSpPr>
               <p:cNvPr id="26" name="TextBox 25">
@@ -9828,8 +9927,8 @@
           </a:p>
         </p:txBody>
       </p:sp>
-      <mc:AlternateContent xmlns:mc="http://schemas.openxmlformats.org/markup-compatibility/2006">
-        <mc:Choice xmlns:a14="http://schemas.microsoft.com/office/drawing/2010/main" Requires="a14">
+      <mc:AlternateContent xmlns:mc="http://schemas.openxmlformats.org/markup-compatibility/2006" xmlns:a14="http://schemas.microsoft.com/office/drawing/2010/main">
+        <mc:Choice Requires="a14">
           <p:sp>
             <p:nvSpPr>
               <p:cNvPr id="30" name="TextBox 29">
@@ -9930,7 +10029,7 @@
             </p:txBody>
           </p:sp>
         </mc:Choice>
-        <mc:Fallback>
+        <mc:Fallback xmlns="">
           <p:sp>
             <p:nvSpPr>
               <p:cNvPr id="30" name="TextBox 29">
@@ -10119,8 +10218,8 @@
           <a:chExt cx="0" cy="0"/>
         </a:xfrm>
       </p:grpSpPr>
-      <mc:AlternateContent xmlns:mc="http://schemas.openxmlformats.org/markup-compatibility/2006">
-        <mc:Choice xmlns:a14="http://schemas.microsoft.com/office/drawing/2010/main" Requires="a14">
+      <mc:AlternateContent xmlns:mc="http://schemas.openxmlformats.org/markup-compatibility/2006" xmlns:a14="http://schemas.microsoft.com/office/drawing/2010/main">
+        <mc:Choice Requires="a14">
           <p:sp>
             <p:nvSpPr>
               <p:cNvPr id="5" name="Content Placeholder 4">
@@ -10208,7 +10307,7 @@
             </p:txBody>
           </p:sp>
         </mc:Choice>
-        <mc:Fallback>
+        <mc:Fallback xmlns="">
           <p:sp>
             <p:nvSpPr>
               <p:cNvPr id="5" name="Content Placeholder 4">

</xml_diff>